<commit_message>
Adding second draft of proposal
</commit_message>
<xml_diff>
--- a/Proposal/Bailey_Proposal.pptx
+++ b/Proposal/Bailey_Proposal.pptx
@@ -3465,9 +3465,15 @@
 <p:sldMaster xmlns:a="http://schemas.openxmlformats.org/drawingml/2006/main" xmlns:r="http://schemas.openxmlformats.org/officeDocument/2006/relationships" xmlns:p="http://schemas.openxmlformats.org/presentationml/2006/main">
   <p:cSld>
     <p:bg>
-      <p:bgRef idx="1001">
-        <a:schemeClr val="bg1"/>
-      </p:bgRef>
+      <p:bgPr>
+        <a:solidFill>
+          <a:schemeClr val="bg1">
+            <a:lumMod val="85000"/>
+            <a:lumOff val="15000"/>
+          </a:schemeClr>
+        </a:solidFill>
+        <a:effectLst/>
+      </p:bgPr>
     </p:bg>
     <p:spTree>
       <p:nvGrpSpPr>
@@ -4211,7 +4217,7 @@
           <a:p>
             <a:r>
               <a:rPr lang="en-US" dirty="0"/>
-              <a:t>Different model</a:t>
+              <a:t>Different models</a:t>
             </a:r>
           </a:p>
           <a:p>
@@ -4281,7 +4287,7 @@
         </p:spPr>
         <p:txBody>
           <a:bodyPr>
-            <a:normAutofit fontScale="90000"/>
+            <a:normAutofit/>
           </a:bodyPr>
           <a:lstStyle/>
           <a:p>
@@ -4293,7 +4299,7 @@
               <a:rPr lang="en-US" dirty="0"/>
             </a:br>
             <a:r>
-              <a:rPr lang="en-US" sz="3600" dirty="0"/>
+              <a:rPr lang="en-US" sz="2700" dirty="0"/>
               <a:t>What factors influence asset allocation of U.S. public pensions?</a:t>
             </a:r>
           </a:p>
@@ -4327,14 +4333,14 @@
           <a:p>
             <a:r>
               <a:rPr lang="en-US" dirty="0"/>
-              <a:t>Why public pensions? </a:t>
+              <a:t>WHY PUBLIC PENSIONS? </a:t>
             </a:r>
           </a:p>
           <a:p>
             <a:pPr lvl="1"/>
             <a:r>
               <a:rPr lang="en-US" dirty="0"/>
-              <a:t>Many U.S. pensions are underfunded</a:t>
+              <a:t>Many U.S. public pensions are underfunded</a:t>
             </a:r>
           </a:p>
           <a:p>
@@ -4356,13 +4362,13 @@
             <a:pPr lvl="2"/>
             <a:r>
               <a:rPr lang="en-US" dirty="0"/>
-              <a:t>This can contribute to bankruptcy (e.g. Detroit, Puerto Rico)</a:t>
-            </a:r>
-          </a:p>
-          <a:p>
-            <a:r>
-              <a:rPr lang="en-US" dirty="0"/>
-              <a:t>Why asset allocation?</a:t>
+              <a:t>In 2017, “US public pension funds lack $3.85tn that they need to pay the retirement benefits of current and retired workers” (Financial Times)</a:t>
+            </a:r>
+          </a:p>
+          <a:p>
+            <a:r>
+              <a:rPr lang="en-US" dirty="0"/>
+              <a:t>WHY ASSET ALLOCATION?</a:t>
             </a:r>
           </a:p>
           <a:p>
@@ -4478,7 +4484,7 @@
             <a:pPr lvl="1"/>
             <a:r>
               <a:rPr lang="en-US" dirty="0"/>
-              <a:t>Plan-Level data on 170 public pension plans: 114 administered at a state level and 56 administered locally</a:t>
+              <a:t>Plan-level data on 170 public pension plans: 114 administered at a state level and 56 administered locally</a:t>
             </a:r>
           </a:p>
           <a:p>
@@ -4513,7 +4519,28 @@
             <a:pPr lvl="2"/>
             <a:r>
               <a:rPr lang="en-US" dirty="0"/>
-              <a:t>Membership (type and quantity), funding, returns, etc.</a:t>
+              <a:t>Membership composition (type and quantity)</a:t>
+            </a:r>
+          </a:p>
+          <a:p>
+            <a:pPr lvl="2"/>
+            <a:r>
+              <a:rPr lang="en-US" dirty="0"/>
+              <a:t>Funding</a:t>
+            </a:r>
+          </a:p>
+          <a:p>
+            <a:pPr lvl="2"/>
+            <a:r>
+              <a:rPr lang="en-US" dirty="0"/>
+              <a:t>Returns</a:t>
+            </a:r>
+          </a:p>
+          <a:p>
+            <a:pPr lvl="2"/>
+            <a:r>
+              <a:rPr lang="en-US" dirty="0"/>
+              <a:t>Etc.</a:t>
             </a:r>
           </a:p>
         </p:txBody>
@@ -4643,6 +4670,13 @@
             <a:pPr lvl="1"/>
             <a:r>
               <a:rPr lang="en-US" dirty="0"/>
+              <a:t>Assets under management</a:t>
+            </a:r>
+          </a:p>
+          <a:p>
+            <a:pPr lvl="1"/>
+            <a:r>
+              <a:rPr lang="en-US" dirty="0"/>
               <a:t>Pension industry</a:t>
             </a:r>
           </a:p>
@@ -4761,7 +4795,7 @@
           <a:p>
             <a:r>
               <a:rPr lang="en-US" dirty="0"/>
-              <a:t>Percent of total invested in:</a:t>
+              <a:t>% total assets invested in:</a:t>
             </a:r>
           </a:p>
           <a:p>
@@ -4816,7 +4850,7 @@
             <a:pPr lvl="1"/>
             <a:r>
               <a:rPr lang="en-US" dirty="0"/>
-              <a:t>NY has higher funded ration</a:t>
+              <a:t>NY has higher funded ratio</a:t>
             </a:r>
           </a:p>
           <a:p>
@@ -4914,14 +4948,6 @@
 <file path=ppt/slides/slide6.xml><?xml version="1.0" encoding="utf-8"?>
 <p:sld xmlns:a="http://schemas.openxmlformats.org/drawingml/2006/main" xmlns:r="http://schemas.openxmlformats.org/officeDocument/2006/relationships" xmlns:p="http://schemas.openxmlformats.org/presentationml/2006/main">
   <p:cSld>
-    <p:bg>
-      <p:bgPr>
-        <a:solidFill>
-          <a:schemeClr val="bg1"/>
-        </a:solidFill>
-        <a:effectLst/>
-      </p:bgPr>
-    </p:bg>
     <p:spTree>
       <p:nvGrpSpPr>
         <p:cNvPr id="1" name=""/>
@@ -5024,7 +5050,7 @@
             </a:pPr>
             <a:r>
               <a:rPr lang="en-US" dirty="0"/>
-              <a:t>fixed income ratio? </a:t>
+              <a:t>fixed income ratio </a:t>
             </a:r>
           </a:p>
           <a:p>
@@ -5038,7 +5064,14 @@
             <a:pPr lvl="2"/>
             <a:r>
               <a:rPr lang="en-US" dirty="0"/>
-              <a:t>Scale of allocation profiles?</a:t>
+              <a:t>Finer-grained ratio</a:t>
+            </a:r>
+          </a:p>
+          <a:p>
+            <a:pPr lvl="2"/>
+            <a:r>
+              <a:rPr lang="en-US" dirty="0"/>
+              <a:t>Scale of allocation profiles</a:t>
             </a:r>
           </a:p>
           <a:p>
@@ -5220,19 +5253,27 @@
             <a:pPr lvl="1"/>
             <a:r>
               <a:rPr lang="en-US" dirty="0"/>
-              <a:t>Logistic regression vs. Random Forest vs. Neural Net</a:t>
-            </a:r>
-          </a:p>
-          <a:p>
-            <a:r>
-              <a:rPr lang="en-US" dirty="0"/>
-              <a:t>Categorical vs. continuous asset allocation variable will influence model selection</a:t>
+              <a:t>Logistic Regression vs. Random Forest vs. Neural Net</a:t>
             </a:r>
           </a:p>
           <a:p>
             <a:r>
               <a:rPr lang="en-US" dirty="0"/>
               <a:t>Take model strengths/weaknesses into account</a:t>
+            </a:r>
+          </a:p>
+          <a:p>
+            <a:pPr lvl="1"/>
+            <a:r>
+              <a:rPr lang="en-US" dirty="0"/>
+              <a:t>Classification vs. continuous model of asset allocation</a:t>
+            </a:r>
+          </a:p>
+          <a:p>
+            <a:pPr lvl="1"/>
+            <a:r>
+              <a:rPr lang="en-US" dirty="0"/>
+              <a:t>Adding more features (Neural Net vs. Random Forest)</a:t>
             </a:r>
           </a:p>
         </p:txBody>
@@ -5326,7 +5367,7 @@
           <a:p>
             <a:r>
               <a:rPr lang="en-US" dirty="0"/>
-              <a:t>Data is relatively small for training and testing set (170 </a:t>
+              <a:t>Data is relatively small (170 </a:t>
             </a:r>
             <a:r>
               <a:rPr lang="en-US" dirty="0" err="1"/>
@@ -5360,14 +5401,14 @@
           <a:p>
             <a:r>
               <a:rPr lang="en-US" dirty="0"/>
-              <a:t>Omitted Variable Bias and correlations between variables:</a:t>
+              <a:t>Omitted Variable Bias and correlations between variables</a:t>
             </a:r>
           </a:p>
           <a:p>
             <a:pPr lvl="1"/>
             <a:r>
               <a:rPr lang="en-US" dirty="0"/>
-              <a:t>Need to think hard about the variables I use</a:t>
+              <a:t>Need to think hard about the exogenous variables I use</a:t>
             </a:r>
           </a:p>
         </p:txBody>
@@ -5499,7 +5540,7 @@
             <a:pPr lvl="1"/>
             <a:r>
               <a:rPr lang="en-US" dirty="0"/>
-              <a:t>Have public sector pension plan managers acted “imprudently” to chase returns after encountering underfunding? No.</a:t>
+              <a:t>Have public sector pension plan managers acted “imprudently” to chase returns after encountering underfunding?</a:t>
             </a:r>
           </a:p>
         </p:txBody>

</xml_diff>